<commit_message>
Adicionado trabalho sobre célula de hidrogenio
</commit_message>
<xml_diff>
--- a/Fábio/Moto geradores/SGR - Prof Fábio - Moto geradores.pptx
+++ b/Fábio/Moto geradores/SGR - Prof Fábio - Moto geradores.pptx
@@ -5,10 +5,10 @@
     <p:sldMasterId id="2147483648" r:id="rId1"/>
   </p:sldMasterIdLst>
   <p:notesMasterIdLst>
-    <p:notesMasterId r:id="rId14"/>
+    <p:notesMasterId r:id="rId18"/>
   </p:notesMasterIdLst>
   <p:handoutMasterIdLst>
-    <p:handoutMasterId r:id="rId15"/>
+    <p:handoutMasterId r:id="rId19"/>
   </p:handoutMasterIdLst>
   <p:sldIdLst>
     <p:sldId id="256" r:id="rId2"/>
@@ -23,6 +23,10 @@
     <p:sldId id="608" r:id="rId11"/>
     <p:sldId id="609" r:id="rId12"/>
     <p:sldId id="610" r:id="rId13"/>
+    <p:sldId id="611" r:id="rId14"/>
+    <p:sldId id="612" r:id="rId15"/>
+    <p:sldId id="613" r:id="rId16"/>
+    <p:sldId id="614" r:id="rId17"/>
   </p:sldIdLst>
   <p:sldSz cx="9144000" cy="6858000" type="screen4x3"/>
   <p:notesSz cx="7099300" cy="10234613"/>
@@ -1280,6 +1284,398 @@
     <p:extLst>
       <p:ext uri="{BB962C8B-B14F-4D97-AF65-F5344CB8AC3E}">
         <p14:creationId xmlns:p14="http://schemas.microsoft.com/office/powerpoint/2010/main" val="3412264811"/>
+      </p:ext>
+    </p:extLst>
+  </p:cSld>
+  <p:clrMapOvr>
+    <a:masterClrMapping/>
+  </p:clrMapOvr>
+</p:notes>
+</file>
+
+<file path=ppt/notesSlides/notesSlide13.xml><?xml version="1.0" encoding="utf-8"?>
+<p:notes xmlns:a="http://schemas.openxmlformats.org/drawingml/2006/main" xmlns:r="http://schemas.openxmlformats.org/officeDocument/2006/relationships" xmlns:p="http://schemas.openxmlformats.org/presentationml/2006/main">
+  <p:cSld>
+    <p:spTree>
+      <p:nvGrpSpPr>
+        <p:cNvPr id="1" name=""/>
+        <p:cNvGrpSpPr/>
+        <p:nvPr/>
+      </p:nvGrpSpPr>
+      <p:grpSpPr>
+        <a:xfrm>
+          <a:off x="0" y="0"/>
+          <a:ext cx="0" cy="0"/>
+          <a:chOff x="0" y="0"/>
+          <a:chExt cx="0" cy="0"/>
+        </a:xfrm>
+      </p:grpSpPr>
+      <p:sp>
+        <p:nvSpPr>
+          <p:cNvPr id="2" name="Espaço Reservado para Imagem de Slide 1"/>
+          <p:cNvSpPr>
+            <a:spLocks noGrp="1" noRot="1" noChangeAspect="1"/>
+          </p:cNvSpPr>
+          <p:nvPr>
+            <p:ph type="sldImg"/>
+          </p:nvPr>
+        </p:nvSpPr>
+        <p:spPr/>
+      </p:sp>
+      <p:sp>
+        <p:nvSpPr>
+          <p:cNvPr id="3" name="Espaço Reservado para Anotações 2"/>
+          <p:cNvSpPr>
+            <a:spLocks noGrp="1"/>
+          </p:cNvSpPr>
+          <p:nvPr>
+            <p:ph type="body" idx="1"/>
+          </p:nvPr>
+        </p:nvSpPr>
+        <p:spPr/>
+        <p:txBody>
+          <a:bodyPr/>
+          <a:lstStyle/>
+          <a:p>
+            <a:endParaRPr lang="en-US" sz="1200" kern="1200" dirty="0">
+              <a:solidFill>
+                <a:schemeClr val="tx1"/>
+              </a:solidFill>
+              <a:effectLst/>
+              <a:latin typeface="Calibri" pitchFamily="34" charset="0"/>
+              <a:ea typeface="+mn-ea"/>
+              <a:cs typeface="+mn-cs"/>
+            </a:endParaRPr>
+          </a:p>
+        </p:txBody>
+      </p:sp>
+      <p:sp>
+        <p:nvSpPr>
+          <p:cNvPr id="4" name="Espaço Reservado para Número de Slide 3"/>
+          <p:cNvSpPr>
+            <a:spLocks noGrp="1"/>
+          </p:cNvSpPr>
+          <p:nvPr>
+            <p:ph type="sldNum" sz="quarter" idx="10"/>
+          </p:nvPr>
+        </p:nvSpPr>
+        <p:spPr/>
+        <p:txBody>
+          <a:bodyPr/>
+          <a:lstStyle/>
+          <a:p>
+            <a:pPr>
+              <a:defRPr/>
+            </a:pPr>
+            <a:fld id="{4CE1C7DD-9813-4F30-A314-2479383F60B8}" type="slidenum">
+              <a:rPr lang="en-US" smtClean="0"/>
+              <a:pPr>
+                <a:defRPr/>
+              </a:pPr>
+              <a:t>13</a:t>
+            </a:fld>
+            <a:endParaRPr lang="en-US" dirty="0"/>
+          </a:p>
+        </p:txBody>
+      </p:sp>
+    </p:spTree>
+    <p:extLst>
+      <p:ext uri="{BB962C8B-B14F-4D97-AF65-F5344CB8AC3E}">
+        <p14:creationId xmlns:p14="http://schemas.microsoft.com/office/powerpoint/2010/main" val="2702708040"/>
+      </p:ext>
+    </p:extLst>
+  </p:cSld>
+  <p:clrMapOvr>
+    <a:masterClrMapping/>
+  </p:clrMapOvr>
+</p:notes>
+</file>
+
+<file path=ppt/notesSlides/notesSlide14.xml><?xml version="1.0" encoding="utf-8"?>
+<p:notes xmlns:a="http://schemas.openxmlformats.org/drawingml/2006/main" xmlns:r="http://schemas.openxmlformats.org/officeDocument/2006/relationships" xmlns:p="http://schemas.openxmlformats.org/presentationml/2006/main">
+  <p:cSld>
+    <p:spTree>
+      <p:nvGrpSpPr>
+        <p:cNvPr id="1" name=""/>
+        <p:cNvGrpSpPr/>
+        <p:nvPr/>
+      </p:nvGrpSpPr>
+      <p:grpSpPr>
+        <a:xfrm>
+          <a:off x="0" y="0"/>
+          <a:ext cx="0" cy="0"/>
+          <a:chOff x="0" y="0"/>
+          <a:chExt cx="0" cy="0"/>
+        </a:xfrm>
+      </p:grpSpPr>
+      <p:sp>
+        <p:nvSpPr>
+          <p:cNvPr id="2" name="Espaço Reservado para Imagem de Slide 1"/>
+          <p:cNvSpPr>
+            <a:spLocks noGrp="1" noRot="1" noChangeAspect="1"/>
+          </p:cNvSpPr>
+          <p:nvPr>
+            <p:ph type="sldImg"/>
+          </p:nvPr>
+        </p:nvSpPr>
+        <p:spPr/>
+      </p:sp>
+      <p:sp>
+        <p:nvSpPr>
+          <p:cNvPr id="3" name="Espaço Reservado para Anotações 2"/>
+          <p:cNvSpPr>
+            <a:spLocks noGrp="1"/>
+          </p:cNvSpPr>
+          <p:nvPr>
+            <p:ph type="body" idx="1"/>
+          </p:nvPr>
+        </p:nvSpPr>
+        <p:spPr/>
+        <p:txBody>
+          <a:bodyPr/>
+          <a:lstStyle/>
+          <a:p>
+            <a:endParaRPr lang="en-US" sz="1200" kern="1200" dirty="0">
+              <a:solidFill>
+                <a:schemeClr val="tx1"/>
+              </a:solidFill>
+              <a:effectLst/>
+              <a:latin typeface="Calibri" pitchFamily="34" charset="0"/>
+              <a:ea typeface="+mn-ea"/>
+              <a:cs typeface="+mn-cs"/>
+            </a:endParaRPr>
+          </a:p>
+        </p:txBody>
+      </p:sp>
+      <p:sp>
+        <p:nvSpPr>
+          <p:cNvPr id="4" name="Espaço Reservado para Número de Slide 3"/>
+          <p:cNvSpPr>
+            <a:spLocks noGrp="1"/>
+          </p:cNvSpPr>
+          <p:nvPr>
+            <p:ph type="sldNum" sz="quarter" idx="10"/>
+          </p:nvPr>
+        </p:nvSpPr>
+        <p:spPr/>
+        <p:txBody>
+          <a:bodyPr/>
+          <a:lstStyle/>
+          <a:p>
+            <a:pPr>
+              <a:defRPr/>
+            </a:pPr>
+            <a:fld id="{4CE1C7DD-9813-4F30-A314-2479383F60B8}" type="slidenum">
+              <a:rPr lang="en-US" smtClean="0"/>
+              <a:pPr>
+                <a:defRPr/>
+              </a:pPr>
+              <a:t>14</a:t>
+            </a:fld>
+            <a:endParaRPr lang="en-US" dirty="0"/>
+          </a:p>
+        </p:txBody>
+      </p:sp>
+    </p:spTree>
+    <p:extLst>
+      <p:ext uri="{BB962C8B-B14F-4D97-AF65-F5344CB8AC3E}">
+        <p14:creationId xmlns:p14="http://schemas.microsoft.com/office/powerpoint/2010/main" val="3732342724"/>
+      </p:ext>
+    </p:extLst>
+  </p:cSld>
+  <p:clrMapOvr>
+    <a:masterClrMapping/>
+  </p:clrMapOvr>
+</p:notes>
+</file>
+
+<file path=ppt/notesSlides/notesSlide15.xml><?xml version="1.0" encoding="utf-8"?>
+<p:notes xmlns:a="http://schemas.openxmlformats.org/drawingml/2006/main" xmlns:r="http://schemas.openxmlformats.org/officeDocument/2006/relationships" xmlns:p="http://schemas.openxmlformats.org/presentationml/2006/main">
+  <p:cSld>
+    <p:spTree>
+      <p:nvGrpSpPr>
+        <p:cNvPr id="1" name=""/>
+        <p:cNvGrpSpPr/>
+        <p:nvPr/>
+      </p:nvGrpSpPr>
+      <p:grpSpPr>
+        <a:xfrm>
+          <a:off x="0" y="0"/>
+          <a:ext cx="0" cy="0"/>
+          <a:chOff x="0" y="0"/>
+          <a:chExt cx="0" cy="0"/>
+        </a:xfrm>
+      </p:grpSpPr>
+      <p:sp>
+        <p:nvSpPr>
+          <p:cNvPr id="2" name="Espaço Reservado para Imagem de Slide 1"/>
+          <p:cNvSpPr>
+            <a:spLocks noGrp="1" noRot="1" noChangeAspect="1"/>
+          </p:cNvSpPr>
+          <p:nvPr>
+            <p:ph type="sldImg"/>
+          </p:nvPr>
+        </p:nvSpPr>
+        <p:spPr/>
+      </p:sp>
+      <p:sp>
+        <p:nvSpPr>
+          <p:cNvPr id="3" name="Espaço Reservado para Anotações 2"/>
+          <p:cNvSpPr>
+            <a:spLocks noGrp="1"/>
+          </p:cNvSpPr>
+          <p:nvPr>
+            <p:ph type="body" idx="1"/>
+          </p:nvPr>
+        </p:nvSpPr>
+        <p:spPr/>
+        <p:txBody>
+          <a:bodyPr/>
+          <a:lstStyle/>
+          <a:p>
+            <a:endParaRPr lang="en-US" sz="1200" kern="1200" dirty="0">
+              <a:solidFill>
+                <a:schemeClr val="tx1"/>
+              </a:solidFill>
+              <a:effectLst/>
+              <a:latin typeface="Calibri" pitchFamily="34" charset="0"/>
+              <a:ea typeface="+mn-ea"/>
+              <a:cs typeface="+mn-cs"/>
+            </a:endParaRPr>
+          </a:p>
+        </p:txBody>
+      </p:sp>
+      <p:sp>
+        <p:nvSpPr>
+          <p:cNvPr id="4" name="Espaço Reservado para Número de Slide 3"/>
+          <p:cNvSpPr>
+            <a:spLocks noGrp="1"/>
+          </p:cNvSpPr>
+          <p:nvPr>
+            <p:ph type="sldNum" sz="quarter" idx="10"/>
+          </p:nvPr>
+        </p:nvSpPr>
+        <p:spPr/>
+        <p:txBody>
+          <a:bodyPr/>
+          <a:lstStyle/>
+          <a:p>
+            <a:pPr>
+              <a:defRPr/>
+            </a:pPr>
+            <a:fld id="{4CE1C7DD-9813-4F30-A314-2479383F60B8}" type="slidenum">
+              <a:rPr lang="en-US" smtClean="0"/>
+              <a:pPr>
+                <a:defRPr/>
+              </a:pPr>
+              <a:t>15</a:t>
+            </a:fld>
+            <a:endParaRPr lang="en-US" dirty="0"/>
+          </a:p>
+        </p:txBody>
+      </p:sp>
+    </p:spTree>
+    <p:extLst>
+      <p:ext uri="{BB962C8B-B14F-4D97-AF65-F5344CB8AC3E}">
+        <p14:creationId xmlns:p14="http://schemas.microsoft.com/office/powerpoint/2010/main" val="232375576"/>
+      </p:ext>
+    </p:extLst>
+  </p:cSld>
+  <p:clrMapOvr>
+    <a:masterClrMapping/>
+  </p:clrMapOvr>
+</p:notes>
+</file>
+
+<file path=ppt/notesSlides/notesSlide16.xml><?xml version="1.0" encoding="utf-8"?>
+<p:notes xmlns:a="http://schemas.openxmlformats.org/drawingml/2006/main" xmlns:r="http://schemas.openxmlformats.org/officeDocument/2006/relationships" xmlns:p="http://schemas.openxmlformats.org/presentationml/2006/main">
+  <p:cSld>
+    <p:spTree>
+      <p:nvGrpSpPr>
+        <p:cNvPr id="1" name=""/>
+        <p:cNvGrpSpPr/>
+        <p:nvPr/>
+      </p:nvGrpSpPr>
+      <p:grpSpPr>
+        <a:xfrm>
+          <a:off x="0" y="0"/>
+          <a:ext cx="0" cy="0"/>
+          <a:chOff x="0" y="0"/>
+          <a:chExt cx="0" cy="0"/>
+        </a:xfrm>
+      </p:grpSpPr>
+      <p:sp>
+        <p:nvSpPr>
+          <p:cNvPr id="2" name="Espaço Reservado para Imagem de Slide 1"/>
+          <p:cNvSpPr>
+            <a:spLocks noGrp="1" noRot="1" noChangeAspect="1"/>
+          </p:cNvSpPr>
+          <p:nvPr>
+            <p:ph type="sldImg"/>
+          </p:nvPr>
+        </p:nvSpPr>
+        <p:spPr/>
+      </p:sp>
+      <p:sp>
+        <p:nvSpPr>
+          <p:cNvPr id="3" name="Espaço Reservado para Anotações 2"/>
+          <p:cNvSpPr>
+            <a:spLocks noGrp="1"/>
+          </p:cNvSpPr>
+          <p:nvPr>
+            <p:ph type="body" idx="1"/>
+          </p:nvPr>
+        </p:nvSpPr>
+        <p:spPr/>
+        <p:txBody>
+          <a:bodyPr/>
+          <a:lstStyle/>
+          <a:p>
+            <a:endParaRPr lang="en-US" sz="1200" kern="1200" dirty="0">
+              <a:solidFill>
+                <a:schemeClr val="tx1"/>
+              </a:solidFill>
+              <a:effectLst/>
+              <a:latin typeface="Calibri" pitchFamily="34" charset="0"/>
+              <a:ea typeface="+mn-ea"/>
+              <a:cs typeface="+mn-cs"/>
+            </a:endParaRPr>
+          </a:p>
+        </p:txBody>
+      </p:sp>
+      <p:sp>
+        <p:nvSpPr>
+          <p:cNvPr id="4" name="Espaço Reservado para Número de Slide 3"/>
+          <p:cNvSpPr>
+            <a:spLocks noGrp="1"/>
+          </p:cNvSpPr>
+          <p:nvPr>
+            <p:ph type="sldNum" sz="quarter" idx="10"/>
+          </p:nvPr>
+        </p:nvSpPr>
+        <p:spPr/>
+        <p:txBody>
+          <a:bodyPr/>
+          <a:lstStyle/>
+          <a:p>
+            <a:pPr>
+              <a:defRPr/>
+            </a:pPr>
+            <a:fld id="{4CE1C7DD-9813-4F30-A314-2479383F60B8}" type="slidenum">
+              <a:rPr lang="en-US" smtClean="0"/>
+              <a:pPr>
+                <a:defRPr/>
+              </a:pPr>
+              <a:t>16</a:t>
+            </a:fld>
+            <a:endParaRPr lang="en-US" dirty="0"/>
+          </a:p>
+        </p:txBody>
+      </p:sp>
+    </p:spTree>
+    <p:extLst>
+      <p:ext uri="{BB962C8B-B14F-4D97-AF65-F5344CB8AC3E}">
+        <p14:creationId xmlns:p14="http://schemas.microsoft.com/office/powerpoint/2010/main" val="3550771696"/>
       </p:ext>
     </p:extLst>
   </p:cSld>
@@ -5776,20 +6172,6 @@
               </a:rPr>
               <a:t>Fábio</a:t>
             </a:r>
-            <a:endParaRPr lang="pt-BR" sz="2800" b="1" cap="all" dirty="0" smtClean="0">
-              <a:solidFill>
-                <a:schemeClr val="tx2"/>
-              </a:solidFill>
-              <a:effectLst>
-                <a:outerShdw blurRad="38100" dist="38100" dir="2700000" algn="tl">
-                  <a:srgbClr val="000000">
-                    <a:alpha val="43137"/>
-                  </a:srgbClr>
-                </a:outerShdw>
-              </a:effectLst>
-              <a:latin typeface="Arial" pitchFamily="34" charset="0"/>
-              <a:cs typeface="Arial" pitchFamily="34" charset="0"/>
-            </a:endParaRPr>
           </a:p>
           <a:p>
             <a:pPr algn="ctr">
@@ -5904,15 +6286,7 @@
                   <a:schemeClr val="tx2"/>
                 </a:solidFill>
               </a:rPr>
-              <a:t>Fábio Cadore </a:t>
-            </a:r>
-            <a:r>
-              <a:rPr lang="pt-BR" sz="2000" b="1" dirty="0" smtClean="0">
-                <a:solidFill>
-                  <a:schemeClr val="tx2"/>
-                </a:solidFill>
-              </a:rPr>
-              <a:t>Posser, Leonardo </a:t>
+              <a:t>Fábio Cadore Posser, Leonardo </a:t>
             </a:r>
             <a:r>
               <a:rPr lang="pt-BR" sz="2000" b="1" dirty="0" err="1" smtClean="0">
@@ -5928,15 +6302,7 @@
                   <a:schemeClr val="tx2"/>
                 </a:solidFill>
               </a:rPr>
-              <a:t>,</a:t>
-            </a:r>
-            <a:r>
-              <a:rPr lang="pt-BR" sz="2000" b="1" dirty="0" smtClean="0">
-                <a:solidFill>
-                  <a:schemeClr val="tx2"/>
-                </a:solidFill>
-              </a:rPr>
-              <a:t> </a:t>
+              <a:t>, </a:t>
             </a:r>
             <a:r>
               <a:rPr lang="pt-BR" sz="2000" b="1" dirty="0" err="1">
@@ -6012,7 +6378,7 @@
                 </a:effectLst>
                 <a:cs typeface="Arial" charset="0"/>
               </a:rPr>
-              <a:t>Outubro 2015</a:t>
+              <a:t>Novembro 2015</a:t>
             </a:r>
             <a:endParaRPr lang="pt-BR" sz="2000" b="1" dirty="0">
               <a:effectLst>
@@ -6567,17 +6933,12 @@
             </a:r>
             <a:r>
               <a:rPr lang="pt-BR" noProof="1"/>
-              <a:t>como fonte de </a:t>
-            </a:r>
-            <a:r>
-              <a:rPr lang="pt-BR" noProof="1"/>
-              <a:t>energia </a:t>
+              <a:t>como fonte de energia </a:t>
             </a:r>
             <a:r>
               <a:rPr lang="pt-BR" noProof="1" smtClean="0"/>
               <a:t>em Power Plants.</a:t>
             </a:r>
-            <a:endParaRPr lang="pt-BR" noProof="1" smtClean="0"/>
           </a:p>
           <a:p>
             <a:pPr marL="0" lvl="1" algn="just"/>
@@ -6885,17 +7246,12 @@
             </a:r>
             <a:r>
               <a:rPr lang="pt-BR" noProof="1"/>
-              <a:t>como fonte de </a:t>
-            </a:r>
-            <a:r>
-              <a:rPr lang="pt-BR" noProof="1"/>
-              <a:t>energia </a:t>
+              <a:t>como fonte de energia </a:t>
             </a:r>
             <a:r>
               <a:rPr lang="pt-BR" noProof="1" smtClean="0"/>
               <a:t>em plataformas, navios e usinas.</a:t>
             </a:r>
-            <a:endParaRPr lang="pt-BR" noProof="1" smtClean="0"/>
           </a:p>
           <a:p>
             <a:pPr marL="0" lvl="1" algn="just"/>
@@ -6994,6 +7350,1420 @@
     <p:extLst>
       <p:ext uri="{BB962C8B-B14F-4D97-AF65-F5344CB8AC3E}">
         <p14:creationId xmlns:p14="http://schemas.microsoft.com/office/powerpoint/2010/main" val="1947573805"/>
+      </p:ext>
+    </p:extLst>
+  </p:cSld>
+  <p:clrMapOvr>
+    <a:masterClrMapping/>
+  </p:clrMapOvr>
+  <p:timing>
+    <p:tnLst>
+      <p:par>
+        <p:cTn id="1" dur="indefinite" restart="never" nodeType="tmRoot"/>
+      </p:par>
+    </p:tnLst>
+  </p:timing>
+</p:sld>
+</file>
+
+<file path=ppt/slides/slide13.xml><?xml version="1.0" encoding="utf-8"?>
+<p:sld xmlns:a="http://schemas.openxmlformats.org/drawingml/2006/main" xmlns:r="http://schemas.openxmlformats.org/officeDocument/2006/relationships" xmlns:p="http://schemas.openxmlformats.org/presentationml/2006/main">
+  <p:cSld>
+    <p:spTree>
+      <p:nvGrpSpPr>
+        <p:cNvPr id="1" name=""/>
+        <p:cNvGrpSpPr/>
+        <p:nvPr/>
+      </p:nvGrpSpPr>
+      <p:grpSpPr>
+        <a:xfrm>
+          <a:off x="0" y="0"/>
+          <a:ext cx="0" cy="0"/>
+          <a:chOff x="0" y="0"/>
+          <a:chExt cx="0" cy="0"/>
+        </a:xfrm>
+      </p:grpSpPr>
+      <p:pic>
+        <p:nvPicPr>
+          <p:cNvPr id="4" name="Imagem 1" descr="Barra_slim.jpg"/>
+          <p:cNvPicPr>
+            <a:picLocks noChangeAspect="1"/>
+          </p:cNvPicPr>
+          <p:nvPr/>
+        </p:nvPicPr>
+        <p:blipFill>
+          <a:blip r:embed="rId3">
+            <a:extLst>
+              <a:ext uri="{28A0092B-C50C-407E-A947-70E740481C1C}">
+                <a14:useLocalDpi xmlns:a14="http://schemas.microsoft.com/office/drawing/2010/main" val="0"/>
+              </a:ext>
+            </a:extLst>
+          </a:blip>
+          <a:srcRect/>
+          <a:stretch>
+            <a:fillRect/>
+          </a:stretch>
+        </p:blipFill>
+        <p:spPr bwMode="auto">
+          <a:xfrm>
+            <a:off x="539750" y="1196975"/>
+            <a:ext cx="8001000" cy="88900"/>
+          </a:xfrm>
+          <a:prstGeom prst="rect">
+            <a:avLst/>
+          </a:prstGeom>
+          <a:noFill/>
+          <a:ln>
+            <a:noFill/>
+          </a:ln>
+          <a:extLst>
+            <a:ext uri="{909E8E84-426E-40DD-AFC4-6F175D3DCCD1}">
+              <a14:hiddenFill xmlns:a14="http://schemas.microsoft.com/office/drawing/2010/main">
+                <a:solidFill>
+                  <a:srgbClr val="FFFFFF"/>
+                </a:solidFill>
+              </a14:hiddenFill>
+            </a:ext>
+            <a:ext uri="{91240B29-F687-4F45-9708-019B960494DF}">
+              <a14:hiddenLine xmlns:a14="http://schemas.microsoft.com/office/drawing/2010/main" w="9525">
+                <a:solidFill>
+                  <a:srgbClr val="000000"/>
+                </a:solidFill>
+                <a:miter lim="800000"/>
+                <a:headEnd/>
+                <a:tailEnd/>
+              </a14:hiddenLine>
+            </a:ext>
+          </a:extLst>
+        </p:spPr>
+      </p:pic>
+      <p:sp>
+        <p:nvSpPr>
+          <p:cNvPr id="5" name="CaixaDeTexto 2"/>
+          <p:cNvSpPr txBox="1">
+            <a:spLocks noChangeArrowheads="1"/>
+          </p:cNvSpPr>
+          <p:nvPr/>
+        </p:nvSpPr>
+        <p:spPr bwMode="auto">
+          <a:xfrm>
+            <a:off x="539750" y="620713"/>
+            <a:ext cx="7920682" cy="523220"/>
+          </a:xfrm>
+          <a:prstGeom prst="rect">
+            <a:avLst/>
+          </a:prstGeom>
+          <a:noFill/>
+          <a:ln w="9525">
+            <a:noFill/>
+            <a:miter lim="800000"/>
+            <a:headEnd/>
+            <a:tailEnd/>
+          </a:ln>
+        </p:spPr>
+        <p:txBody>
+          <a:bodyPr wrap="square">
+            <a:spAutoFit/>
+          </a:bodyPr>
+          <a:lstStyle/>
+          <a:p>
+            <a:pPr>
+              <a:defRPr/>
+            </a:pPr>
+            <a:r>
+              <a:rPr lang="pt-BR" sz="2800" b="1" dirty="0" smtClean="0">
+                <a:solidFill>
+                  <a:schemeClr val="tx2"/>
+                </a:solidFill>
+                <a:cs typeface="Arial" charset="0"/>
+              </a:rPr>
+              <a:t>ABB</a:t>
+            </a:r>
+            <a:endParaRPr lang="pt-BR" sz="2800" b="1" dirty="0">
+              <a:effectLst>
+                <a:outerShdw blurRad="38100" dist="38100" dir="2700000" algn="tl">
+                  <a:srgbClr val="C0C0C0"/>
+                </a:outerShdw>
+              </a:effectLst>
+              <a:cs typeface="Arial" charset="0"/>
+            </a:endParaRPr>
+          </a:p>
+        </p:txBody>
+      </p:sp>
+      <p:sp>
+        <p:nvSpPr>
+          <p:cNvPr id="11" name="Rectangle 9"/>
+          <p:cNvSpPr>
+            <a:spLocks noChangeArrowheads="1"/>
+          </p:cNvSpPr>
+          <p:nvPr/>
+        </p:nvSpPr>
+        <p:spPr bwMode="auto">
+          <a:xfrm>
+            <a:off x="611758" y="1340768"/>
+            <a:ext cx="7776666" cy="2585323"/>
+          </a:xfrm>
+          <a:prstGeom prst="rect">
+            <a:avLst/>
+          </a:prstGeom>
+          <a:noFill/>
+          <a:ln>
+            <a:noFill/>
+          </a:ln>
+          <a:extLst>
+            <a:ext uri="{909E8E84-426E-40DD-AFC4-6F175D3DCCD1}">
+              <a14:hiddenFill xmlns:a14="http://schemas.microsoft.com/office/drawing/2010/main">
+                <a:solidFill>
+                  <a:srgbClr val="FFFFFF"/>
+                </a:solidFill>
+              </a14:hiddenFill>
+            </a:ext>
+            <a:ext uri="{91240B29-F687-4F45-9708-019B960494DF}">
+              <a14:hiddenLine xmlns:a14="http://schemas.microsoft.com/office/drawing/2010/main" w="9525">
+                <a:solidFill>
+                  <a:srgbClr val="000000"/>
+                </a:solidFill>
+                <a:miter lim="800000"/>
+                <a:headEnd/>
+                <a:tailEnd/>
+              </a14:hiddenLine>
+            </a:ext>
+          </a:extLst>
+        </p:spPr>
+        <p:txBody>
+          <a:bodyPr wrap="square">
+            <a:spAutoFit/>
+          </a:bodyPr>
+          <a:lstStyle/>
+          <a:p>
+            <a:pPr marL="0" lvl="1" algn="just"/>
+            <a:r>
+              <a:rPr lang="pt-BR" dirty="0" err="1"/>
+              <a:t>Low</a:t>
+            </a:r>
+            <a:r>
+              <a:rPr lang="pt-BR" dirty="0"/>
+              <a:t> </a:t>
+            </a:r>
+            <a:r>
+              <a:rPr lang="pt-BR" dirty="0" err="1"/>
+              <a:t>voltage</a:t>
+            </a:r>
+            <a:r>
+              <a:rPr lang="pt-BR" dirty="0"/>
+              <a:t> standard marine </a:t>
+            </a:r>
+            <a:r>
+              <a:rPr lang="pt-BR" dirty="0" err="1" smtClean="0"/>
+              <a:t>generators</a:t>
+            </a:r>
+            <a:r>
+              <a:rPr lang="pt-BR" dirty="0" smtClean="0"/>
+              <a:t> </a:t>
+            </a:r>
+            <a:r>
+              <a:rPr lang="pt-BR" noProof="1" smtClean="0"/>
+              <a:t>- </a:t>
+            </a:r>
+            <a:r>
+              <a:rPr lang="pt-BR" dirty="0" smtClean="0"/>
+              <a:t>utilizados </a:t>
+            </a:r>
+            <a:r>
+              <a:rPr lang="pt-BR" noProof="1"/>
+              <a:t>como fonte de energia </a:t>
+            </a:r>
+            <a:r>
+              <a:rPr lang="pt-BR" noProof="1" smtClean="0"/>
+              <a:t>em </a:t>
+            </a:r>
+            <a:r>
+              <a:rPr lang="pt-BR" noProof="1" smtClean="0"/>
+              <a:t>plataformas e navios.</a:t>
+            </a:r>
+            <a:endParaRPr lang="pt-BR" noProof="1" smtClean="0"/>
+          </a:p>
+          <a:p>
+            <a:pPr marL="0" lvl="1" algn="just"/>
+            <a:endParaRPr lang="pt-BR" noProof="1" smtClean="0"/>
+          </a:p>
+          <a:p>
+            <a:pPr marL="0" lvl="1" algn="just"/>
+            <a:r>
+              <a:rPr lang="pt-BR" dirty="0"/>
+              <a:t>Potências: </a:t>
+            </a:r>
+            <a:r>
+              <a:rPr lang="pt-BR" dirty="0" smtClean="0"/>
+              <a:t>até </a:t>
+            </a:r>
+            <a:r>
+              <a:rPr lang="pt-BR" dirty="0" smtClean="0"/>
+              <a:t>2430 </a:t>
+            </a:r>
+            <a:r>
+              <a:rPr lang="pt-BR" dirty="0" smtClean="0"/>
+              <a:t>kVA</a:t>
+            </a:r>
+          </a:p>
+          <a:p>
+            <a:pPr marL="0" lvl="1" algn="just"/>
+            <a:endParaRPr lang="pt-BR" noProof="1" smtClean="0"/>
+          </a:p>
+          <a:p>
+            <a:pPr marL="0" lvl="1" algn="just"/>
+            <a:r>
+              <a:rPr lang="pt-BR" dirty="0"/>
+              <a:t>Excitação com bobina </a:t>
+            </a:r>
+            <a:r>
+              <a:rPr lang="pt-BR" dirty="0" smtClean="0"/>
+              <a:t>auxiliar.</a:t>
+            </a:r>
+            <a:endParaRPr lang="pt-BR" dirty="0"/>
+          </a:p>
+          <a:p>
+            <a:pPr marL="0" lvl="1" algn="just"/>
+            <a:r>
+              <a:rPr lang="pt-BR" dirty="0"/>
+              <a:t>Como opcional, a linha permite a utilização de uma </a:t>
+            </a:r>
+            <a:r>
+              <a:rPr lang="pt-BR" dirty="0" err="1"/>
+              <a:t>excitatriz</a:t>
+            </a:r>
+            <a:r>
+              <a:rPr lang="pt-BR" dirty="0"/>
+              <a:t> auxiliar com ímãs permanentes.</a:t>
+            </a:r>
+            <a:endParaRPr lang="pt-BR" noProof="1"/>
+          </a:p>
+          <a:p>
+            <a:pPr marL="0" lvl="1" algn="just"/>
+            <a:endParaRPr lang="pt-BR" dirty="0" smtClean="0"/>
+          </a:p>
+        </p:txBody>
+      </p:sp>
+      <p:sp>
+        <p:nvSpPr>
+          <p:cNvPr id="3" name="Espaço Reservado para Número de Slide 2"/>
+          <p:cNvSpPr>
+            <a:spLocks noGrp="1"/>
+          </p:cNvSpPr>
+          <p:nvPr>
+            <p:ph type="sldNum" sz="quarter" idx="12"/>
+          </p:nvPr>
+        </p:nvSpPr>
+        <p:spPr/>
+        <p:txBody>
+          <a:bodyPr/>
+          <a:lstStyle/>
+          <a:p>
+            <a:pPr>
+              <a:defRPr/>
+            </a:pPr>
+            <a:fld id="{C362C408-B6DC-46BB-A65C-2B5CBEE2E4BD}" type="slidenum">
+              <a:rPr lang="pt-BR" smtClean="0"/>
+              <a:pPr>
+                <a:defRPr/>
+              </a:pPr>
+              <a:t>13</a:t>
+            </a:fld>
+            <a:endParaRPr lang="pt-BR" dirty="0"/>
+          </a:p>
+        </p:txBody>
+      </p:sp>
+      <p:pic>
+        <p:nvPicPr>
+          <p:cNvPr id="6" name="Imagem 5"/>
+          <p:cNvPicPr>
+            <a:picLocks noChangeAspect="1"/>
+          </p:cNvPicPr>
+          <p:nvPr/>
+        </p:nvPicPr>
+        <p:blipFill>
+          <a:blip r:embed="rId4"/>
+          <a:stretch>
+            <a:fillRect/>
+          </a:stretch>
+        </p:blipFill>
+        <p:spPr>
+          <a:xfrm>
+            <a:off x="5076056" y="3591636"/>
+            <a:ext cx="3152775" cy="2686050"/>
+          </a:xfrm>
+          <a:prstGeom prst="rect">
+            <a:avLst/>
+          </a:prstGeom>
+        </p:spPr>
+      </p:pic>
+    </p:spTree>
+    <p:extLst>
+      <p:ext uri="{BB962C8B-B14F-4D97-AF65-F5344CB8AC3E}">
+        <p14:creationId xmlns:p14="http://schemas.microsoft.com/office/powerpoint/2010/main" val="2624060359"/>
+      </p:ext>
+    </p:extLst>
+  </p:cSld>
+  <p:clrMapOvr>
+    <a:masterClrMapping/>
+  </p:clrMapOvr>
+  <p:timing>
+    <p:tnLst>
+      <p:par>
+        <p:cTn id="1" dur="indefinite" restart="never" nodeType="tmRoot"/>
+      </p:par>
+    </p:tnLst>
+  </p:timing>
+</p:sld>
+</file>
+
+<file path=ppt/slides/slide14.xml><?xml version="1.0" encoding="utf-8"?>
+<p:sld xmlns:a="http://schemas.openxmlformats.org/drawingml/2006/main" xmlns:r="http://schemas.openxmlformats.org/officeDocument/2006/relationships" xmlns:p="http://schemas.openxmlformats.org/presentationml/2006/main">
+  <p:cSld>
+    <p:spTree>
+      <p:nvGrpSpPr>
+        <p:cNvPr id="1" name=""/>
+        <p:cNvGrpSpPr/>
+        <p:nvPr/>
+      </p:nvGrpSpPr>
+      <p:grpSpPr>
+        <a:xfrm>
+          <a:off x="0" y="0"/>
+          <a:ext cx="0" cy="0"/>
+          <a:chOff x="0" y="0"/>
+          <a:chExt cx="0" cy="0"/>
+        </a:xfrm>
+      </p:grpSpPr>
+      <p:pic>
+        <p:nvPicPr>
+          <p:cNvPr id="4" name="Imagem 1" descr="Barra_slim.jpg"/>
+          <p:cNvPicPr>
+            <a:picLocks noChangeAspect="1"/>
+          </p:cNvPicPr>
+          <p:nvPr/>
+        </p:nvPicPr>
+        <p:blipFill>
+          <a:blip r:embed="rId3">
+            <a:extLst>
+              <a:ext uri="{28A0092B-C50C-407E-A947-70E740481C1C}">
+                <a14:useLocalDpi xmlns:a14="http://schemas.microsoft.com/office/drawing/2010/main" val="0"/>
+              </a:ext>
+            </a:extLst>
+          </a:blip>
+          <a:srcRect/>
+          <a:stretch>
+            <a:fillRect/>
+          </a:stretch>
+        </p:blipFill>
+        <p:spPr bwMode="auto">
+          <a:xfrm>
+            <a:off x="539750" y="1196975"/>
+            <a:ext cx="8001000" cy="88900"/>
+          </a:xfrm>
+          <a:prstGeom prst="rect">
+            <a:avLst/>
+          </a:prstGeom>
+          <a:noFill/>
+          <a:ln>
+            <a:noFill/>
+          </a:ln>
+          <a:extLst>
+            <a:ext uri="{909E8E84-426E-40DD-AFC4-6F175D3DCCD1}">
+              <a14:hiddenFill xmlns:a14="http://schemas.microsoft.com/office/drawing/2010/main">
+                <a:solidFill>
+                  <a:srgbClr val="FFFFFF"/>
+                </a:solidFill>
+              </a14:hiddenFill>
+            </a:ext>
+            <a:ext uri="{91240B29-F687-4F45-9708-019B960494DF}">
+              <a14:hiddenLine xmlns:a14="http://schemas.microsoft.com/office/drawing/2010/main" w="9525">
+                <a:solidFill>
+                  <a:srgbClr val="000000"/>
+                </a:solidFill>
+                <a:miter lim="800000"/>
+                <a:headEnd/>
+                <a:tailEnd/>
+              </a14:hiddenLine>
+            </a:ext>
+          </a:extLst>
+        </p:spPr>
+      </p:pic>
+      <p:sp>
+        <p:nvSpPr>
+          <p:cNvPr id="5" name="CaixaDeTexto 2"/>
+          <p:cNvSpPr txBox="1">
+            <a:spLocks noChangeArrowheads="1"/>
+          </p:cNvSpPr>
+          <p:nvPr/>
+        </p:nvSpPr>
+        <p:spPr bwMode="auto">
+          <a:xfrm>
+            <a:off x="539750" y="620713"/>
+            <a:ext cx="7920682" cy="523220"/>
+          </a:xfrm>
+          <a:prstGeom prst="rect">
+            <a:avLst/>
+          </a:prstGeom>
+          <a:noFill/>
+          <a:ln w="9525">
+            <a:noFill/>
+            <a:miter lim="800000"/>
+            <a:headEnd/>
+            <a:tailEnd/>
+          </a:ln>
+        </p:spPr>
+        <p:txBody>
+          <a:bodyPr wrap="square">
+            <a:spAutoFit/>
+          </a:bodyPr>
+          <a:lstStyle/>
+          <a:p>
+            <a:pPr>
+              <a:defRPr/>
+            </a:pPr>
+            <a:r>
+              <a:rPr lang="pt-BR" sz="2800" b="1" dirty="0" smtClean="0">
+                <a:solidFill>
+                  <a:schemeClr val="tx2"/>
+                </a:solidFill>
+                <a:cs typeface="Arial" charset="0"/>
+              </a:rPr>
+              <a:t>ABB</a:t>
+            </a:r>
+            <a:endParaRPr lang="pt-BR" sz="2800" b="1" dirty="0">
+              <a:effectLst>
+                <a:outerShdw blurRad="38100" dist="38100" dir="2700000" algn="tl">
+                  <a:srgbClr val="C0C0C0"/>
+                </a:outerShdw>
+              </a:effectLst>
+              <a:cs typeface="Arial" charset="0"/>
+            </a:endParaRPr>
+          </a:p>
+        </p:txBody>
+      </p:sp>
+      <p:sp>
+        <p:nvSpPr>
+          <p:cNvPr id="11" name="Rectangle 9"/>
+          <p:cNvSpPr>
+            <a:spLocks noChangeArrowheads="1"/>
+          </p:cNvSpPr>
+          <p:nvPr/>
+        </p:nvSpPr>
+        <p:spPr bwMode="auto">
+          <a:xfrm>
+            <a:off x="611758" y="1340768"/>
+            <a:ext cx="7776666" cy="2031325"/>
+          </a:xfrm>
+          <a:prstGeom prst="rect">
+            <a:avLst/>
+          </a:prstGeom>
+          <a:noFill/>
+          <a:ln>
+            <a:noFill/>
+          </a:ln>
+          <a:extLst>
+            <a:ext uri="{909E8E84-426E-40DD-AFC4-6F175D3DCCD1}">
+              <a14:hiddenFill xmlns:a14="http://schemas.microsoft.com/office/drawing/2010/main">
+                <a:solidFill>
+                  <a:srgbClr val="FFFFFF"/>
+                </a:solidFill>
+              </a14:hiddenFill>
+            </a:ext>
+            <a:ext uri="{91240B29-F687-4F45-9708-019B960494DF}">
+              <a14:hiddenLine xmlns:a14="http://schemas.microsoft.com/office/drawing/2010/main" w="9525">
+                <a:solidFill>
+                  <a:srgbClr val="000000"/>
+                </a:solidFill>
+                <a:miter lim="800000"/>
+                <a:headEnd/>
+                <a:tailEnd/>
+              </a14:hiddenLine>
+            </a:ext>
+          </a:extLst>
+        </p:spPr>
+        <p:txBody>
+          <a:bodyPr wrap="square">
+            <a:spAutoFit/>
+          </a:bodyPr>
+          <a:lstStyle/>
+          <a:p>
+            <a:pPr marL="0" lvl="1" algn="just"/>
+            <a:r>
+              <a:rPr lang="pt-BR" dirty="0" err="1"/>
+              <a:t>Low</a:t>
+            </a:r>
+            <a:r>
+              <a:rPr lang="pt-BR" dirty="0"/>
+              <a:t> </a:t>
+            </a:r>
+            <a:r>
+              <a:rPr lang="pt-BR" dirty="0" err="1"/>
+              <a:t>voltage</a:t>
+            </a:r>
+            <a:r>
+              <a:rPr lang="pt-BR" dirty="0"/>
+              <a:t> </a:t>
+            </a:r>
+            <a:r>
+              <a:rPr lang="pt-BR" dirty="0" smtClean="0"/>
+              <a:t>modular marine </a:t>
+            </a:r>
+            <a:r>
+              <a:rPr lang="pt-BR" dirty="0" err="1" smtClean="0"/>
+              <a:t>generators</a:t>
+            </a:r>
+            <a:r>
+              <a:rPr lang="pt-BR" dirty="0" smtClean="0"/>
+              <a:t> </a:t>
+            </a:r>
+            <a:r>
+              <a:rPr lang="pt-BR" noProof="1" smtClean="0"/>
+              <a:t>- </a:t>
+            </a:r>
+            <a:r>
+              <a:rPr lang="pt-BR" dirty="0" smtClean="0"/>
+              <a:t>utilizados </a:t>
+            </a:r>
+            <a:r>
+              <a:rPr lang="pt-BR" noProof="1"/>
+              <a:t>como fonte de energia </a:t>
+            </a:r>
+            <a:r>
+              <a:rPr lang="pt-BR" noProof="1" smtClean="0"/>
+              <a:t>em </a:t>
+            </a:r>
+            <a:r>
+              <a:rPr lang="pt-BR" noProof="1" smtClean="0"/>
+              <a:t>plataformas e navios.</a:t>
+            </a:r>
+            <a:endParaRPr lang="pt-BR" noProof="1" smtClean="0"/>
+          </a:p>
+          <a:p>
+            <a:pPr marL="0" lvl="1" algn="just"/>
+            <a:endParaRPr lang="pt-BR" noProof="1" smtClean="0"/>
+          </a:p>
+          <a:p>
+            <a:pPr marL="0" lvl="1" algn="just"/>
+            <a:r>
+              <a:rPr lang="pt-BR" dirty="0"/>
+              <a:t>Potências: </a:t>
+            </a:r>
+            <a:r>
+              <a:rPr lang="pt-BR" dirty="0" smtClean="0"/>
+              <a:t>até </a:t>
+            </a:r>
+            <a:r>
+              <a:rPr lang="pt-BR" dirty="0" smtClean="0"/>
+              <a:t>500</a:t>
+            </a:r>
+            <a:r>
+              <a:rPr lang="pt-BR" dirty="0" smtClean="0"/>
+              <a:t>0 </a:t>
+            </a:r>
+            <a:r>
+              <a:rPr lang="pt-BR" dirty="0" smtClean="0"/>
+              <a:t>kVA</a:t>
+            </a:r>
+          </a:p>
+          <a:p>
+            <a:pPr marL="0" lvl="1" algn="just"/>
+            <a:endParaRPr lang="pt-BR" noProof="1" smtClean="0"/>
+          </a:p>
+          <a:p>
+            <a:pPr marL="0" lvl="1" algn="just"/>
+            <a:r>
+              <a:rPr lang="pt-BR" dirty="0"/>
+              <a:t>Excitação com bobina </a:t>
+            </a:r>
+            <a:r>
+              <a:rPr lang="pt-BR" dirty="0" smtClean="0"/>
+              <a:t>auxiliar e </a:t>
+            </a:r>
+            <a:r>
+              <a:rPr lang="pt-BR" dirty="0"/>
+              <a:t>com ímãs permanentes.</a:t>
+            </a:r>
+            <a:endParaRPr lang="pt-BR" noProof="1"/>
+          </a:p>
+          <a:p>
+            <a:pPr marL="0" lvl="1" algn="just"/>
+            <a:endParaRPr lang="pt-BR" dirty="0" smtClean="0"/>
+          </a:p>
+        </p:txBody>
+      </p:sp>
+      <p:sp>
+        <p:nvSpPr>
+          <p:cNvPr id="3" name="Espaço Reservado para Número de Slide 2"/>
+          <p:cNvSpPr>
+            <a:spLocks noGrp="1"/>
+          </p:cNvSpPr>
+          <p:nvPr>
+            <p:ph type="sldNum" sz="quarter" idx="12"/>
+          </p:nvPr>
+        </p:nvSpPr>
+        <p:spPr/>
+        <p:txBody>
+          <a:bodyPr/>
+          <a:lstStyle/>
+          <a:p>
+            <a:pPr>
+              <a:defRPr/>
+            </a:pPr>
+            <a:fld id="{C362C408-B6DC-46BB-A65C-2B5CBEE2E4BD}" type="slidenum">
+              <a:rPr lang="pt-BR" smtClean="0"/>
+              <a:pPr>
+                <a:defRPr/>
+              </a:pPr>
+              <a:t>14</a:t>
+            </a:fld>
+            <a:endParaRPr lang="pt-BR" dirty="0"/>
+          </a:p>
+        </p:txBody>
+      </p:sp>
+      <p:pic>
+        <p:nvPicPr>
+          <p:cNvPr id="2" name="Imagem 1"/>
+          <p:cNvPicPr>
+            <a:picLocks noChangeAspect="1"/>
+          </p:cNvPicPr>
+          <p:nvPr/>
+        </p:nvPicPr>
+        <p:blipFill>
+          <a:blip r:embed="rId4"/>
+          <a:stretch>
+            <a:fillRect/>
+          </a:stretch>
+        </p:blipFill>
+        <p:spPr>
+          <a:xfrm>
+            <a:off x="5076056" y="3387044"/>
+            <a:ext cx="3024336" cy="3151868"/>
+          </a:xfrm>
+          <a:prstGeom prst="rect">
+            <a:avLst/>
+          </a:prstGeom>
+        </p:spPr>
+      </p:pic>
+    </p:spTree>
+    <p:extLst>
+      <p:ext uri="{BB962C8B-B14F-4D97-AF65-F5344CB8AC3E}">
+        <p14:creationId xmlns:p14="http://schemas.microsoft.com/office/powerpoint/2010/main" val="2621080922"/>
+      </p:ext>
+    </p:extLst>
+  </p:cSld>
+  <p:clrMapOvr>
+    <a:masterClrMapping/>
+  </p:clrMapOvr>
+  <p:timing>
+    <p:tnLst>
+      <p:par>
+        <p:cTn id="1" dur="indefinite" restart="never" nodeType="tmRoot"/>
+      </p:par>
+    </p:tnLst>
+  </p:timing>
+</p:sld>
+</file>
+
+<file path=ppt/slides/slide15.xml><?xml version="1.0" encoding="utf-8"?>
+<p:sld xmlns:a="http://schemas.openxmlformats.org/drawingml/2006/main" xmlns:r="http://schemas.openxmlformats.org/officeDocument/2006/relationships" xmlns:p="http://schemas.openxmlformats.org/presentationml/2006/main">
+  <p:cSld>
+    <p:spTree>
+      <p:nvGrpSpPr>
+        <p:cNvPr id="1" name=""/>
+        <p:cNvGrpSpPr/>
+        <p:nvPr/>
+      </p:nvGrpSpPr>
+      <p:grpSpPr>
+        <a:xfrm>
+          <a:off x="0" y="0"/>
+          <a:ext cx="0" cy="0"/>
+          <a:chOff x="0" y="0"/>
+          <a:chExt cx="0" cy="0"/>
+        </a:xfrm>
+      </p:grpSpPr>
+      <p:pic>
+        <p:nvPicPr>
+          <p:cNvPr id="4" name="Imagem 1" descr="Barra_slim.jpg"/>
+          <p:cNvPicPr>
+            <a:picLocks noChangeAspect="1"/>
+          </p:cNvPicPr>
+          <p:nvPr/>
+        </p:nvPicPr>
+        <p:blipFill>
+          <a:blip r:embed="rId3">
+            <a:extLst>
+              <a:ext uri="{28A0092B-C50C-407E-A947-70E740481C1C}">
+                <a14:useLocalDpi xmlns:a14="http://schemas.microsoft.com/office/drawing/2010/main" val="0"/>
+              </a:ext>
+            </a:extLst>
+          </a:blip>
+          <a:srcRect/>
+          <a:stretch>
+            <a:fillRect/>
+          </a:stretch>
+        </p:blipFill>
+        <p:spPr bwMode="auto">
+          <a:xfrm>
+            <a:off x="539750" y="1196975"/>
+            <a:ext cx="8001000" cy="88900"/>
+          </a:xfrm>
+          <a:prstGeom prst="rect">
+            <a:avLst/>
+          </a:prstGeom>
+          <a:noFill/>
+          <a:ln>
+            <a:noFill/>
+          </a:ln>
+          <a:extLst>
+            <a:ext uri="{909E8E84-426E-40DD-AFC4-6F175D3DCCD1}">
+              <a14:hiddenFill xmlns:a14="http://schemas.microsoft.com/office/drawing/2010/main">
+                <a:solidFill>
+                  <a:srgbClr val="FFFFFF"/>
+                </a:solidFill>
+              </a14:hiddenFill>
+            </a:ext>
+            <a:ext uri="{91240B29-F687-4F45-9708-019B960494DF}">
+              <a14:hiddenLine xmlns:a14="http://schemas.microsoft.com/office/drawing/2010/main" w="9525">
+                <a:solidFill>
+                  <a:srgbClr val="000000"/>
+                </a:solidFill>
+                <a:miter lim="800000"/>
+                <a:headEnd/>
+                <a:tailEnd/>
+              </a14:hiddenLine>
+            </a:ext>
+          </a:extLst>
+        </p:spPr>
+      </p:pic>
+      <p:sp>
+        <p:nvSpPr>
+          <p:cNvPr id="5" name="CaixaDeTexto 2"/>
+          <p:cNvSpPr txBox="1">
+            <a:spLocks noChangeArrowheads="1"/>
+          </p:cNvSpPr>
+          <p:nvPr/>
+        </p:nvSpPr>
+        <p:spPr bwMode="auto">
+          <a:xfrm>
+            <a:off x="539750" y="620713"/>
+            <a:ext cx="7920682" cy="523220"/>
+          </a:xfrm>
+          <a:prstGeom prst="rect">
+            <a:avLst/>
+          </a:prstGeom>
+          <a:noFill/>
+          <a:ln w="9525">
+            <a:noFill/>
+            <a:miter lim="800000"/>
+            <a:headEnd/>
+            <a:tailEnd/>
+          </a:ln>
+        </p:spPr>
+        <p:txBody>
+          <a:bodyPr wrap="square">
+            <a:spAutoFit/>
+          </a:bodyPr>
+          <a:lstStyle/>
+          <a:p>
+            <a:pPr>
+              <a:defRPr/>
+            </a:pPr>
+            <a:r>
+              <a:rPr lang="pt-BR" sz="2800" b="1" dirty="0" smtClean="0">
+                <a:solidFill>
+                  <a:schemeClr val="tx2"/>
+                </a:solidFill>
+                <a:cs typeface="Arial" charset="0"/>
+              </a:rPr>
+              <a:t>ABB</a:t>
+            </a:r>
+            <a:endParaRPr lang="pt-BR" sz="2800" b="1" dirty="0">
+              <a:effectLst>
+                <a:outerShdw blurRad="38100" dist="38100" dir="2700000" algn="tl">
+                  <a:srgbClr val="C0C0C0"/>
+                </a:outerShdw>
+              </a:effectLst>
+              <a:cs typeface="Arial" charset="0"/>
+            </a:endParaRPr>
+          </a:p>
+        </p:txBody>
+      </p:sp>
+      <p:sp>
+        <p:nvSpPr>
+          <p:cNvPr id="11" name="Rectangle 9"/>
+          <p:cNvSpPr>
+            <a:spLocks noChangeArrowheads="1"/>
+          </p:cNvSpPr>
+          <p:nvPr/>
+        </p:nvSpPr>
+        <p:spPr bwMode="auto">
+          <a:xfrm>
+            <a:off x="611758" y="1340768"/>
+            <a:ext cx="7776666" cy="2585323"/>
+          </a:xfrm>
+          <a:prstGeom prst="rect">
+            <a:avLst/>
+          </a:prstGeom>
+          <a:noFill/>
+          <a:ln>
+            <a:noFill/>
+          </a:ln>
+          <a:extLst>
+            <a:ext uri="{909E8E84-426E-40DD-AFC4-6F175D3DCCD1}">
+              <a14:hiddenFill xmlns:a14="http://schemas.microsoft.com/office/drawing/2010/main">
+                <a:solidFill>
+                  <a:srgbClr val="FFFFFF"/>
+                </a:solidFill>
+              </a14:hiddenFill>
+            </a:ext>
+            <a:ext uri="{91240B29-F687-4F45-9708-019B960494DF}">
+              <a14:hiddenLine xmlns:a14="http://schemas.microsoft.com/office/drawing/2010/main" w="9525">
+                <a:solidFill>
+                  <a:srgbClr val="000000"/>
+                </a:solidFill>
+                <a:miter lim="800000"/>
+                <a:headEnd/>
+                <a:tailEnd/>
+              </a14:hiddenLine>
+            </a:ext>
+          </a:extLst>
+        </p:spPr>
+        <p:txBody>
+          <a:bodyPr wrap="square">
+            <a:spAutoFit/>
+          </a:bodyPr>
+          <a:lstStyle/>
+          <a:p>
+            <a:pPr marL="0" lvl="1" algn="just"/>
+            <a:r>
+              <a:rPr lang="pt-BR" dirty="0"/>
+              <a:t>High </a:t>
+            </a:r>
+            <a:r>
+              <a:rPr lang="pt-BR" dirty="0" err="1"/>
+              <a:t>voltage</a:t>
+            </a:r>
+            <a:r>
+              <a:rPr lang="pt-BR" dirty="0"/>
+              <a:t> marine </a:t>
+            </a:r>
+            <a:r>
+              <a:rPr lang="pt-BR" dirty="0" err="1" smtClean="0"/>
+              <a:t>generators</a:t>
+            </a:r>
+            <a:r>
+              <a:rPr lang="pt-BR" dirty="0" smtClean="0"/>
+              <a:t> </a:t>
+            </a:r>
+            <a:r>
+              <a:rPr lang="pt-BR" noProof="1" smtClean="0"/>
+              <a:t>- </a:t>
+            </a:r>
+            <a:r>
+              <a:rPr lang="pt-BR" dirty="0" smtClean="0"/>
+              <a:t>utilizados </a:t>
+            </a:r>
+            <a:r>
+              <a:rPr lang="pt-BR" noProof="1"/>
+              <a:t>como fonte de energia </a:t>
+            </a:r>
+            <a:r>
+              <a:rPr lang="pt-BR" noProof="1" smtClean="0"/>
+              <a:t>em </a:t>
+            </a:r>
+            <a:r>
+              <a:rPr lang="pt-BR" noProof="1" smtClean="0"/>
+              <a:t>plataformas e navios.</a:t>
+            </a:r>
+            <a:endParaRPr lang="pt-BR" noProof="1" smtClean="0"/>
+          </a:p>
+          <a:p>
+            <a:pPr marL="0" lvl="1" algn="just"/>
+            <a:endParaRPr lang="pt-BR" noProof="1" smtClean="0"/>
+          </a:p>
+          <a:p>
+            <a:pPr marL="0" lvl="1" algn="just"/>
+            <a:r>
+              <a:rPr lang="pt-BR" dirty="0"/>
+              <a:t>Potências: </a:t>
+            </a:r>
+            <a:r>
+              <a:rPr lang="pt-BR" dirty="0" smtClean="0"/>
+              <a:t>até </a:t>
+            </a:r>
+            <a:r>
+              <a:rPr lang="pt-BR" dirty="0" smtClean="0"/>
+              <a:t>5000</a:t>
+            </a:r>
+            <a:r>
+              <a:rPr lang="pt-BR" dirty="0" smtClean="0"/>
+              <a:t>0 </a:t>
+            </a:r>
+            <a:r>
+              <a:rPr lang="pt-BR" dirty="0" smtClean="0"/>
+              <a:t>kVA</a:t>
+            </a:r>
+          </a:p>
+          <a:p>
+            <a:pPr marL="0" lvl="1" algn="just"/>
+            <a:endParaRPr lang="pt-BR" noProof="1" smtClean="0"/>
+          </a:p>
+          <a:p>
+            <a:pPr marL="0" lvl="1" algn="just"/>
+            <a:r>
+              <a:rPr lang="pt-BR" dirty="0"/>
+              <a:t>Excitação com tecnologia </a:t>
+            </a:r>
+            <a:r>
+              <a:rPr lang="pt-BR" i="1" dirty="0"/>
+              <a:t>“ABB shunt </a:t>
+            </a:r>
+            <a:r>
+              <a:rPr lang="pt-BR" i="1" dirty="0" err="1" smtClean="0"/>
+              <a:t>boost</a:t>
+            </a:r>
+            <a:r>
+              <a:rPr lang="pt-BR" i="1" dirty="0" smtClean="0"/>
+              <a:t> </a:t>
+            </a:r>
+            <a:r>
+              <a:rPr lang="pt-BR" i="1" dirty="0" err="1" smtClean="0"/>
+              <a:t>excitation</a:t>
+            </a:r>
+            <a:r>
+              <a:rPr lang="pt-BR" i="1" dirty="0" smtClean="0"/>
+              <a:t> </a:t>
+            </a:r>
+            <a:r>
+              <a:rPr lang="pt-BR" i="1" dirty="0"/>
+              <a:t>system</a:t>
+            </a:r>
+            <a:r>
+              <a:rPr lang="pt-BR" i="1" dirty="0" smtClean="0"/>
+              <a:t>”. </a:t>
+            </a:r>
+          </a:p>
+          <a:p>
+            <a:pPr marL="0" lvl="1" algn="just"/>
+            <a:r>
+              <a:rPr lang="pt-BR" dirty="0" smtClean="0"/>
+              <a:t>Utiliza um transformador na tensão e saída para a excitação.</a:t>
+            </a:r>
+          </a:p>
+          <a:p>
+            <a:pPr marL="0" lvl="1" algn="just"/>
+            <a:r>
+              <a:rPr lang="pt-BR" dirty="0" smtClean="0"/>
+              <a:t>Caso haja um curto circuito, utiliza um transformador de corrente.</a:t>
+            </a:r>
+            <a:endParaRPr lang="pt-BR" noProof="1"/>
+          </a:p>
+          <a:p>
+            <a:pPr marL="0" lvl="1" algn="just"/>
+            <a:endParaRPr lang="pt-BR" dirty="0" smtClean="0"/>
+          </a:p>
+        </p:txBody>
+      </p:sp>
+      <p:sp>
+        <p:nvSpPr>
+          <p:cNvPr id="3" name="Espaço Reservado para Número de Slide 2"/>
+          <p:cNvSpPr>
+            <a:spLocks noGrp="1"/>
+          </p:cNvSpPr>
+          <p:nvPr>
+            <p:ph type="sldNum" sz="quarter" idx="12"/>
+          </p:nvPr>
+        </p:nvSpPr>
+        <p:spPr/>
+        <p:txBody>
+          <a:bodyPr/>
+          <a:lstStyle/>
+          <a:p>
+            <a:pPr>
+              <a:defRPr/>
+            </a:pPr>
+            <a:fld id="{C362C408-B6DC-46BB-A65C-2B5CBEE2E4BD}" type="slidenum">
+              <a:rPr lang="pt-BR" smtClean="0"/>
+              <a:pPr>
+                <a:defRPr/>
+              </a:pPr>
+              <a:t>15</a:t>
+            </a:fld>
+            <a:endParaRPr lang="pt-BR" dirty="0"/>
+          </a:p>
+        </p:txBody>
+      </p:sp>
+      <p:pic>
+        <p:nvPicPr>
+          <p:cNvPr id="6" name="Imagem 5"/>
+          <p:cNvPicPr>
+            <a:picLocks noChangeAspect="1"/>
+          </p:cNvPicPr>
+          <p:nvPr/>
+        </p:nvPicPr>
+        <p:blipFill>
+          <a:blip r:embed="rId4"/>
+          <a:stretch>
+            <a:fillRect/>
+          </a:stretch>
+        </p:blipFill>
+        <p:spPr>
+          <a:xfrm>
+            <a:off x="4885006" y="3559958"/>
+            <a:ext cx="3336388" cy="2973883"/>
+          </a:xfrm>
+          <a:prstGeom prst="rect">
+            <a:avLst/>
+          </a:prstGeom>
+        </p:spPr>
+      </p:pic>
+    </p:spTree>
+    <p:extLst>
+      <p:ext uri="{BB962C8B-B14F-4D97-AF65-F5344CB8AC3E}">
+        <p14:creationId xmlns:p14="http://schemas.microsoft.com/office/powerpoint/2010/main" val="1008457305"/>
+      </p:ext>
+    </p:extLst>
+  </p:cSld>
+  <p:clrMapOvr>
+    <a:masterClrMapping/>
+  </p:clrMapOvr>
+  <p:timing>
+    <p:tnLst>
+      <p:par>
+        <p:cTn id="1" dur="indefinite" restart="never" nodeType="tmRoot"/>
+      </p:par>
+    </p:tnLst>
+  </p:timing>
+</p:sld>
+</file>
+
+<file path=ppt/slides/slide16.xml><?xml version="1.0" encoding="utf-8"?>
+<p:sld xmlns:a="http://schemas.openxmlformats.org/drawingml/2006/main" xmlns:r="http://schemas.openxmlformats.org/officeDocument/2006/relationships" xmlns:p="http://schemas.openxmlformats.org/presentationml/2006/main">
+  <p:cSld>
+    <p:spTree>
+      <p:nvGrpSpPr>
+        <p:cNvPr id="1" name=""/>
+        <p:cNvGrpSpPr/>
+        <p:nvPr/>
+      </p:nvGrpSpPr>
+      <p:grpSpPr>
+        <a:xfrm>
+          <a:off x="0" y="0"/>
+          <a:ext cx="0" cy="0"/>
+          <a:chOff x="0" y="0"/>
+          <a:chExt cx="0" cy="0"/>
+        </a:xfrm>
+      </p:grpSpPr>
+      <p:pic>
+        <p:nvPicPr>
+          <p:cNvPr id="4" name="Imagem 1" descr="Barra_slim.jpg"/>
+          <p:cNvPicPr>
+            <a:picLocks noChangeAspect="1"/>
+          </p:cNvPicPr>
+          <p:nvPr/>
+        </p:nvPicPr>
+        <p:blipFill>
+          <a:blip r:embed="rId3">
+            <a:extLst>
+              <a:ext uri="{28A0092B-C50C-407E-A947-70E740481C1C}">
+                <a14:useLocalDpi xmlns:a14="http://schemas.microsoft.com/office/drawing/2010/main" val="0"/>
+              </a:ext>
+            </a:extLst>
+          </a:blip>
+          <a:srcRect/>
+          <a:stretch>
+            <a:fillRect/>
+          </a:stretch>
+        </p:blipFill>
+        <p:spPr bwMode="auto">
+          <a:xfrm>
+            <a:off x="539750" y="1196975"/>
+            <a:ext cx="8001000" cy="88900"/>
+          </a:xfrm>
+          <a:prstGeom prst="rect">
+            <a:avLst/>
+          </a:prstGeom>
+          <a:noFill/>
+          <a:ln>
+            <a:noFill/>
+          </a:ln>
+          <a:extLst>
+            <a:ext uri="{909E8E84-426E-40DD-AFC4-6F175D3DCCD1}">
+              <a14:hiddenFill xmlns:a14="http://schemas.microsoft.com/office/drawing/2010/main">
+                <a:solidFill>
+                  <a:srgbClr val="FFFFFF"/>
+                </a:solidFill>
+              </a14:hiddenFill>
+            </a:ext>
+            <a:ext uri="{91240B29-F687-4F45-9708-019B960494DF}">
+              <a14:hiddenLine xmlns:a14="http://schemas.microsoft.com/office/drawing/2010/main" w="9525">
+                <a:solidFill>
+                  <a:srgbClr val="000000"/>
+                </a:solidFill>
+                <a:miter lim="800000"/>
+                <a:headEnd/>
+                <a:tailEnd/>
+              </a14:hiddenLine>
+            </a:ext>
+          </a:extLst>
+        </p:spPr>
+      </p:pic>
+      <p:sp>
+        <p:nvSpPr>
+          <p:cNvPr id="5" name="CaixaDeTexto 2"/>
+          <p:cNvSpPr txBox="1">
+            <a:spLocks noChangeArrowheads="1"/>
+          </p:cNvSpPr>
+          <p:nvPr/>
+        </p:nvSpPr>
+        <p:spPr bwMode="auto">
+          <a:xfrm>
+            <a:off x="539750" y="620713"/>
+            <a:ext cx="7920682" cy="523220"/>
+          </a:xfrm>
+          <a:prstGeom prst="rect">
+            <a:avLst/>
+          </a:prstGeom>
+          <a:noFill/>
+          <a:ln w="9525">
+            <a:noFill/>
+            <a:miter lim="800000"/>
+            <a:headEnd/>
+            <a:tailEnd/>
+          </a:ln>
+        </p:spPr>
+        <p:txBody>
+          <a:bodyPr wrap="square">
+            <a:spAutoFit/>
+          </a:bodyPr>
+          <a:lstStyle/>
+          <a:p>
+            <a:pPr>
+              <a:defRPr/>
+            </a:pPr>
+            <a:r>
+              <a:rPr lang="pt-BR" sz="2800" b="1" dirty="0" smtClean="0">
+                <a:solidFill>
+                  <a:schemeClr val="tx2"/>
+                </a:solidFill>
+                <a:cs typeface="Arial" charset="0"/>
+              </a:rPr>
+              <a:t>ABB</a:t>
+            </a:r>
+            <a:endParaRPr lang="pt-BR" sz="2800" b="1" dirty="0">
+              <a:effectLst>
+                <a:outerShdw blurRad="38100" dist="38100" dir="2700000" algn="tl">
+                  <a:srgbClr val="C0C0C0"/>
+                </a:outerShdw>
+              </a:effectLst>
+              <a:cs typeface="Arial" charset="0"/>
+            </a:endParaRPr>
+          </a:p>
+        </p:txBody>
+      </p:sp>
+      <p:sp>
+        <p:nvSpPr>
+          <p:cNvPr id="11" name="Rectangle 9"/>
+          <p:cNvSpPr>
+            <a:spLocks noChangeArrowheads="1"/>
+          </p:cNvSpPr>
+          <p:nvPr/>
+        </p:nvSpPr>
+        <p:spPr bwMode="auto">
+          <a:xfrm>
+            <a:off x="611758" y="1340768"/>
+            <a:ext cx="7776666" cy="1477328"/>
+          </a:xfrm>
+          <a:prstGeom prst="rect">
+            <a:avLst/>
+          </a:prstGeom>
+          <a:noFill/>
+          <a:ln>
+            <a:noFill/>
+          </a:ln>
+          <a:extLst>
+            <a:ext uri="{909E8E84-426E-40DD-AFC4-6F175D3DCCD1}">
+              <a14:hiddenFill xmlns:a14="http://schemas.microsoft.com/office/drawing/2010/main">
+                <a:solidFill>
+                  <a:srgbClr val="FFFFFF"/>
+                </a:solidFill>
+              </a14:hiddenFill>
+            </a:ext>
+            <a:ext uri="{91240B29-F687-4F45-9708-019B960494DF}">
+              <a14:hiddenLine xmlns:a14="http://schemas.microsoft.com/office/drawing/2010/main" w="9525">
+                <a:solidFill>
+                  <a:srgbClr val="000000"/>
+                </a:solidFill>
+                <a:miter lim="800000"/>
+                <a:headEnd/>
+                <a:tailEnd/>
+              </a14:hiddenLine>
+            </a:ext>
+          </a:extLst>
+        </p:spPr>
+        <p:txBody>
+          <a:bodyPr wrap="square">
+            <a:spAutoFit/>
+          </a:bodyPr>
+          <a:lstStyle/>
+          <a:p>
+            <a:pPr marL="0" lvl="1" algn="just"/>
+            <a:r>
+              <a:rPr lang="pt-BR" dirty="0" err="1"/>
+              <a:t>Rail</a:t>
+            </a:r>
+            <a:r>
+              <a:rPr lang="pt-BR" dirty="0"/>
+              <a:t> </a:t>
+            </a:r>
+            <a:r>
+              <a:rPr lang="pt-BR" dirty="0" err="1"/>
+              <a:t>traction</a:t>
+            </a:r>
+            <a:r>
+              <a:rPr lang="pt-BR" dirty="0"/>
+              <a:t> </a:t>
+            </a:r>
+            <a:r>
+              <a:rPr lang="pt-BR" noProof="1" smtClean="0"/>
+              <a:t>- </a:t>
+            </a:r>
+            <a:r>
+              <a:rPr lang="pt-BR" dirty="0" smtClean="0"/>
+              <a:t>utilizados </a:t>
+            </a:r>
+            <a:r>
+              <a:rPr lang="pt-BR" dirty="0" smtClean="0"/>
+              <a:t>na indústria de tração.</a:t>
+            </a:r>
+            <a:endParaRPr lang="pt-BR" noProof="1" smtClean="0"/>
+          </a:p>
+          <a:p>
+            <a:pPr marL="0" lvl="1" algn="just"/>
+            <a:endParaRPr lang="pt-BR" noProof="1" smtClean="0"/>
+          </a:p>
+          <a:p>
+            <a:pPr marL="0" lvl="1" algn="just"/>
+            <a:r>
+              <a:rPr lang="pt-BR" dirty="0"/>
+              <a:t>Potências: </a:t>
+            </a:r>
+            <a:r>
+              <a:rPr lang="pt-BR" dirty="0" smtClean="0"/>
+              <a:t>até </a:t>
+            </a:r>
+            <a:r>
+              <a:rPr lang="pt-BR" dirty="0" smtClean="0"/>
+              <a:t>330</a:t>
+            </a:r>
+            <a:r>
+              <a:rPr lang="pt-BR" dirty="0" smtClean="0"/>
+              <a:t>0 </a:t>
+            </a:r>
+            <a:r>
+              <a:rPr lang="pt-BR" dirty="0" smtClean="0"/>
+              <a:t>kVA</a:t>
+            </a:r>
+          </a:p>
+          <a:p>
+            <a:pPr marL="0" lvl="1" algn="just"/>
+            <a:endParaRPr lang="pt-BR" noProof="1" smtClean="0"/>
+          </a:p>
+          <a:p>
+            <a:pPr marL="0" lvl="1" algn="just"/>
+            <a:r>
+              <a:rPr lang="pt-BR" dirty="0"/>
+              <a:t>Excitação </a:t>
+            </a:r>
+            <a:r>
+              <a:rPr lang="pt-BR" dirty="0" smtClean="0"/>
+              <a:t>gerador auxiliar.</a:t>
+            </a:r>
+            <a:endParaRPr lang="pt-BR" dirty="0" smtClean="0"/>
+          </a:p>
+        </p:txBody>
+      </p:sp>
+      <p:sp>
+        <p:nvSpPr>
+          <p:cNvPr id="3" name="Espaço Reservado para Número de Slide 2"/>
+          <p:cNvSpPr>
+            <a:spLocks noGrp="1"/>
+          </p:cNvSpPr>
+          <p:nvPr>
+            <p:ph type="sldNum" sz="quarter" idx="12"/>
+          </p:nvPr>
+        </p:nvSpPr>
+        <p:spPr/>
+        <p:txBody>
+          <a:bodyPr/>
+          <a:lstStyle/>
+          <a:p>
+            <a:pPr>
+              <a:defRPr/>
+            </a:pPr>
+            <a:fld id="{C362C408-B6DC-46BB-A65C-2B5CBEE2E4BD}" type="slidenum">
+              <a:rPr lang="pt-BR" smtClean="0"/>
+              <a:pPr>
+                <a:defRPr/>
+              </a:pPr>
+              <a:t>16</a:t>
+            </a:fld>
+            <a:endParaRPr lang="pt-BR" dirty="0"/>
+          </a:p>
+        </p:txBody>
+      </p:sp>
+      <p:pic>
+        <p:nvPicPr>
+          <p:cNvPr id="2" name="Imagem 1"/>
+          <p:cNvPicPr>
+            <a:picLocks noChangeAspect="1"/>
+          </p:cNvPicPr>
+          <p:nvPr/>
+        </p:nvPicPr>
+        <p:blipFill>
+          <a:blip r:embed="rId4"/>
+          <a:stretch>
+            <a:fillRect/>
+          </a:stretch>
+        </p:blipFill>
+        <p:spPr>
+          <a:xfrm>
+            <a:off x="899592" y="3942857"/>
+            <a:ext cx="3257550" cy="2390775"/>
+          </a:xfrm>
+          <a:prstGeom prst="rect">
+            <a:avLst/>
+          </a:prstGeom>
+        </p:spPr>
+      </p:pic>
+      <p:pic>
+        <p:nvPicPr>
+          <p:cNvPr id="8" name="Imagem 7"/>
+          <p:cNvPicPr>
+            <a:picLocks noChangeAspect="1"/>
+          </p:cNvPicPr>
+          <p:nvPr/>
+        </p:nvPicPr>
+        <p:blipFill>
+          <a:blip r:embed="rId5"/>
+          <a:stretch>
+            <a:fillRect/>
+          </a:stretch>
+        </p:blipFill>
+        <p:spPr>
+          <a:xfrm>
+            <a:off x="5173163" y="2292949"/>
+            <a:ext cx="3513637" cy="4040683"/>
+          </a:xfrm>
+          <a:prstGeom prst="rect">
+            <a:avLst/>
+          </a:prstGeom>
+        </p:spPr>
+      </p:pic>
+    </p:spTree>
+    <p:extLst>
+      <p:ext uri="{BB962C8B-B14F-4D97-AF65-F5344CB8AC3E}">
+        <p14:creationId xmlns:p14="http://schemas.microsoft.com/office/powerpoint/2010/main" val="120269641"/>
       </p:ext>
     </p:extLst>
   </p:cSld>
@@ -7439,8 +9209,9 @@
             </a:pPr>
             <a:r>
               <a:rPr lang="pt-BR" noProof="1" smtClean="0"/>
-              <a:t>Aaa;</a:t>
-            </a:r>
+              <a:t>ABB;</a:t>
+            </a:r>
+            <a:endParaRPr lang="pt-BR" noProof="1" smtClean="0"/>
           </a:p>
           <a:p>
             <a:pPr marL="285750" lvl="1" indent="-285750" algn="just">
@@ -9128,11 +10899,7 @@
             </a:r>
             <a:r>
               <a:rPr lang="pt-BR" noProof="1"/>
-              <a:t>como fonte de energia para alimentação de aeronaves </a:t>
-            </a:r>
-            <a:r>
-              <a:rPr lang="pt-BR" noProof="1"/>
-              <a:t>em </a:t>
+              <a:t>como fonte de energia para alimentação de aeronaves em </a:t>
             </a:r>
             <a:r>
               <a:rPr lang="pt-BR" noProof="1" smtClean="0"/>

</xml_diff>